<commit_message>
add meeting notes, update legends
</commit_message>
<xml_diff>
--- a/Meeting Reports/Meeting06022020.pptx
+++ b/Meeting Reports/Meeting06022020.pptx
@@ -7,9 +7,10 @@
   <p:sldIdLst>
     <p:sldId id="259" r:id="rId2"/>
     <p:sldId id="260" r:id="rId3"/>
-    <p:sldId id="256" r:id="rId4"/>
-    <p:sldId id="257" r:id="rId5"/>
-    <p:sldId id="258" r:id="rId6"/>
+    <p:sldId id="261" r:id="rId4"/>
+    <p:sldId id="256" r:id="rId5"/>
+    <p:sldId id="257" r:id="rId6"/>
+    <p:sldId id="258" r:id="rId7"/>
   </p:sldIdLst>
   <p:sldSz cx="12192000" cy="6858000"/>
   <p:notesSz cx="6858000" cy="9144000"/>
@@ -3762,15 +3763,7 @@
           <a:p>
             <a:r>
               <a:rPr lang="en-US" dirty="0"/>
-              <a:t>Power Measurement from </a:t>
-            </a:r>
-            <a:r>
-              <a:rPr lang="en-US" dirty="0" err="1"/>
-              <a:t>Pixhawk</a:t>
-            </a:r>
-            <a:r>
-              <a:rPr lang="en-US" dirty="0"/>
-              <a:t> (to be calibrated but got it)</a:t>
+              <a:t>Power Measurement from Pixhawk (to be calibrated but got it)</a:t>
             </a:r>
           </a:p>
           <a:p>
@@ -4292,18 +4285,18 @@
       </p:grpSpPr>
       <p:sp>
         <p:nvSpPr>
-          <p:cNvPr id="2" name="Title 1">
-            <a:extLst>
-              <a:ext uri="{FF2B5EF4-FFF2-40B4-BE49-F238E27FC236}">
-                <a16:creationId xmlns:a16="http://schemas.microsoft.com/office/drawing/2014/main" id="{07452BE0-9AFC-7B4F-A9A3-7818A54F19BB}"/>
-              </a:ext>
-            </a:extLst>
-          </p:cNvPr>
-          <p:cNvSpPr>
-            <a:spLocks noGrp="1"/>
-          </p:cNvSpPr>
-          <p:nvPr>
-            <p:ph type="ctrTitle"/>
+          <p:cNvPr id="10" name="Title 9">
+            <a:extLst>
+              <a:ext uri="{FF2B5EF4-FFF2-40B4-BE49-F238E27FC236}">
+                <a16:creationId xmlns:a16="http://schemas.microsoft.com/office/drawing/2014/main" id="{09600C49-C569-384A-ABD7-55BBB6C6C1FF}"/>
+              </a:ext>
+            </a:extLst>
+          </p:cNvPr>
+          <p:cNvSpPr>
+            <a:spLocks noGrp="1"/>
+          </p:cNvSpPr>
+          <p:nvPr>
+            <p:ph type="title"/>
           </p:nvPr>
         </p:nvSpPr>
         <p:spPr/>
@@ -4311,41 +4304,292 @@
           <a:bodyPr/>
           <a:lstStyle/>
           <a:p>
-            <a:endParaRPr lang="en-US"/>
-          </a:p>
-        </p:txBody>
-      </p:sp>
-      <p:sp>
-        <p:nvSpPr>
-          <p:cNvPr id="3" name="Subtitle 2">
-            <a:extLst>
-              <a:ext uri="{FF2B5EF4-FFF2-40B4-BE49-F238E27FC236}">
-                <a16:creationId xmlns:a16="http://schemas.microsoft.com/office/drawing/2014/main" id="{FC6D5848-5DC5-EC4A-B6C6-4E724295AF44}"/>
-              </a:ext>
-            </a:extLst>
-          </p:cNvPr>
-          <p:cNvSpPr>
-            <a:spLocks noGrp="1"/>
-          </p:cNvSpPr>
-          <p:nvPr>
-            <p:ph type="subTitle" idx="1"/>
-          </p:nvPr>
-        </p:nvSpPr>
-        <p:spPr/>
-        <p:txBody>
-          <a:bodyPr/>
-          <a:lstStyle/>
-          <a:p>
-            <a:endParaRPr lang="en-US"/>
+            <a:r>
+              <a:rPr lang="en-US" dirty="0"/>
+              <a:t>Raw collected data</a:t>
+            </a:r>
           </a:p>
         </p:txBody>
       </p:sp>
       <p:pic>
         <p:nvPicPr>
-          <p:cNvPr id="5" name="Picture 4" descr="A close up of a map&#10;&#10;Description automatically generated">
-            <a:extLst>
-              <a:ext uri="{FF2B5EF4-FFF2-40B4-BE49-F238E27FC236}">
-                <a16:creationId xmlns:a16="http://schemas.microsoft.com/office/drawing/2014/main" id="{FF7E5B68-07A6-7241-A6A6-789568D1CE72}"/>
+          <p:cNvPr id="9" name="Content Placeholder 8" descr="A screenshot of a computer&#10;&#10;Description automatically generated">
+            <a:extLst>
+              <a:ext uri="{FF2B5EF4-FFF2-40B4-BE49-F238E27FC236}">
+                <a16:creationId xmlns:a16="http://schemas.microsoft.com/office/drawing/2014/main" id="{D39E933D-75F2-A64F-BD09-4FDDE94F90DA}"/>
+              </a:ext>
+            </a:extLst>
+          </p:cNvPr>
+          <p:cNvPicPr>
+            <a:picLocks noGrp="1" noChangeAspect="1"/>
+          </p:cNvPicPr>
+          <p:nvPr>
+            <p:ph idx="1"/>
+          </p:nvPr>
+        </p:nvPicPr>
+        <p:blipFill>
+          <a:blip r:embed="rId2"/>
+          <a:stretch>
+            <a:fillRect/>
+          </a:stretch>
+        </p:blipFill>
+        <p:spPr>
+          <a:xfrm>
+            <a:off x="1715507" y="1825625"/>
+            <a:ext cx="8760985" cy="4351338"/>
+          </a:xfrm>
+        </p:spPr>
+      </p:pic>
+      <p:sp>
+        <p:nvSpPr>
+          <p:cNvPr id="11" name="TextBox 10">
+            <a:extLst>
+              <a:ext uri="{FF2B5EF4-FFF2-40B4-BE49-F238E27FC236}">
+                <a16:creationId xmlns:a16="http://schemas.microsoft.com/office/drawing/2014/main" id="{3D7E8374-519A-E24B-A6BA-269B03939EC8}"/>
+              </a:ext>
+            </a:extLst>
+          </p:cNvPr>
+          <p:cNvSpPr txBox="1"/>
+          <p:nvPr/>
+        </p:nvSpPr>
+        <p:spPr>
+          <a:xfrm>
+            <a:off x="838199" y="2771775"/>
+            <a:ext cx="1563611" cy="369332"/>
+          </a:xfrm>
+          <a:prstGeom prst="rect">
+            <a:avLst/>
+          </a:prstGeom>
+          <a:noFill/>
+        </p:spPr>
+        <p:txBody>
+          <a:bodyPr wrap="square" rtlCol="0">
+            <a:spAutoFit/>
+          </a:bodyPr>
+          <a:lstStyle/>
+          <a:p>
+            <a:r>
+              <a:rPr lang="en-US" i="1" dirty="0">
+                <a:solidFill>
+                  <a:schemeClr val="bg1">
+                    <a:lumMod val="50000"/>
+                  </a:schemeClr>
+                </a:solidFill>
+              </a:rPr>
+              <a:t>(RPM Sensor)</a:t>
+            </a:r>
+          </a:p>
+        </p:txBody>
+      </p:sp>
+      <p:sp>
+        <p:nvSpPr>
+          <p:cNvPr id="12" name="TextBox 11">
+            <a:extLst>
+              <a:ext uri="{FF2B5EF4-FFF2-40B4-BE49-F238E27FC236}">
+                <a16:creationId xmlns:a16="http://schemas.microsoft.com/office/drawing/2014/main" id="{5396ABA7-F9E0-AE42-8688-6A04C7189AF9}"/>
+              </a:ext>
+            </a:extLst>
+          </p:cNvPr>
+          <p:cNvSpPr txBox="1"/>
+          <p:nvPr/>
+        </p:nvSpPr>
+        <p:spPr>
+          <a:xfrm>
+            <a:off x="1029203" y="4738688"/>
+            <a:ext cx="1372607" cy="369332"/>
+          </a:xfrm>
+          <a:prstGeom prst="rect">
+            <a:avLst/>
+          </a:prstGeom>
+          <a:noFill/>
+        </p:spPr>
+        <p:txBody>
+          <a:bodyPr wrap="square" rtlCol="0">
+            <a:spAutoFit/>
+          </a:bodyPr>
+          <a:lstStyle/>
+          <a:p>
+            <a:r>
+              <a:rPr lang="en-US" i="1" dirty="0">
+                <a:solidFill>
+                  <a:schemeClr val="bg1">
+                    <a:lumMod val="50000"/>
+                  </a:schemeClr>
+                </a:solidFill>
+              </a:rPr>
+              <a:t>(Loadcell)</a:t>
+            </a:r>
+          </a:p>
+        </p:txBody>
+      </p:sp>
+      <p:sp>
+        <p:nvSpPr>
+          <p:cNvPr id="13" name="TextBox 12">
+            <a:extLst>
+              <a:ext uri="{FF2B5EF4-FFF2-40B4-BE49-F238E27FC236}">
+                <a16:creationId xmlns:a16="http://schemas.microsoft.com/office/drawing/2014/main" id="{0C2ABFC3-5C48-5348-8273-B1D76A8F16A9}"/>
+              </a:ext>
+            </a:extLst>
+          </p:cNvPr>
+          <p:cNvSpPr txBox="1"/>
+          <p:nvPr/>
+        </p:nvSpPr>
+        <p:spPr>
+          <a:xfrm>
+            <a:off x="9981193" y="2771775"/>
+            <a:ext cx="1372607" cy="369332"/>
+          </a:xfrm>
+          <a:prstGeom prst="rect">
+            <a:avLst/>
+          </a:prstGeom>
+          <a:noFill/>
+        </p:spPr>
+        <p:txBody>
+          <a:bodyPr wrap="square" rtlCol="0">
+            <a:spAutoFit/>
+          </a:bodyPr>
+          <a:lstStyle/>
+          <a:p>
+            <a:r>
+              <a:rPr lang="en-US" i="1" dirty="0">
+                <a:solidFill>
+                  <a:schemeClr val="bg1">
+                    <a:lumMod val="50000"/>
+                  </a:schemeClr>
+                </a:solidFill>
+              </a:rPr>
+              <a:t>(Pixhawk)</a:t>
+            </a:r>
+          </a:p>
+        </p:txBody>
+      </p:sp>
+      <p:sp>
+        <p:nvSpPr>
+          <p:cNvPr id="14" name="TextBox 13">
+            <a:extLst>
+              <a:ext uri="{FF2B5EF4-FFF2-40B4-BE49-F238E27FC236}">
+                <a16:creationId xmlns:a16="http://schemas.microsoft.com/office/drawing/2014/main" id="{C0DC4B6C-0B97-1B42-A297-95993A961E60}"/>
+              </a:ext>
+            </a:extLst>
+          </p:cNvPr>
+          <p:cNvSpPr txBox="1"/>
+          <p:nvPr/>
+        </p:nvSpPr>
+        <p:spPr>
+          <a:xfrm>
+            <a:off x="9981192" y="4738688"/>
+            <a:ext cx="1372607" cy="369332"/>
+          </a:xfrm>
+          <a:prstGeom prst="rect">
+            <a:avLst/>
+          </a:prstGeom>
+          <a:noFill/>
+        </p:spPr>
+        <p:txBody>
+          <a:bodyPr wrap="square" rtlCol="0">
+            <a:spAutoFit/>
+          </a:bodyPr>
+          <a:lstStyle/>
+          <a:p>
+            <a:r>
+              <a:rPr lang="en-US" i="1" dirty="0">
+                <a:solidFill>
+                  <a:schemeClr val="bg1">
+                    <a:lumMod val="50000"/>
+                  </a:schemeClr>
+                </a:solidFill>
+              </a:rPr>
+              <a:t>(Pixhawk)</a:t>
+            </a:r>
+          </a:p>
+        </p:txBody>
+      </p:sp>
+    </p:spTree>
+    <p:extLst>
+      <p:ext uri="{BB962C8B-B14F-4D97-AF65-F5344CB8AC3E}">
+        <p14:creationId xmlns:p14="http://schemas.microsoft.com/office/powerpoint/2010/main" val="1000594213"/>
+      </p:ext>
+    </p:extLst>
+  </p:cSld>
+  <p:clrMapOvr>
+    <a:masterClrMapping/>
+  </p:clrMapOvr>
+</p:sld>
+</file>
+
+<file path=ppt/slides/slide4.xml><?xml version="1.0" encoding="utf-8"?>
+<p:sld xmlns:a="http://schemas.openxmlformats.org/drawingml/2006/main" xmlns:r="http://schemas.openxmlformats.org/officeDocument/2006/relationships" xmlns:p="http://schemas.openxmlformats.org/presentationml/2006/main">
+  <p:cSld>
+    <p:spTree>
+      <p:nvGrpSpPr>
+        <p:cNvPr id="1" name=""/>
+        <p:cNvGrpSpPr/>
+        <p:nvPr/>
+      </p:nvGrpSpPr>
+      <p:grpSpPr>
+        <a:xfrm>
+          <a:off x="0" y="0"/>
+          <a:ext cx="0" cy="0"/>
+          <a:chOff x="0" y="0"/>
+          <a:chExt cx="0" cy="0"/>
+        </a:xfrm>
+      </p:grpSpPr>
+      <p:sp>
+        <p:nvSpPr>
+          <p:cNvPr id="2" name="Title 1">
+            <a:extLst>
+              <a:ext uri="{FF2B5EF4-FFF2-40B4-BE49-F238E27FC236}">
+                <a16:creationId xmlns:a16="http://schemas.microsoft.com/office/drawing/2014/main" id="{07452BE0-9AFC-7B4F-A9A3-7818A54F19BB}"/>
+              </a:ext>
+            </a:extLst>
+          </p:cNvPr>
+          <p:cNvSpPr>
+            <a:spLocks noGrp="1"/>
+          </p:cNvSpPr>
+          <p:nvPr>
+            <p:ph type="ctrTitle"/>
+          </p:nvPr>
+        </p:nvSpPr>
+        <p:spPr/>
+        <p:txBody>
+          <a:bodyPr/>
+          <a:lstStyle/>
+          <a:p>
+            <a:endParaRPr lang="en-US"/>
+          </a:p>
+        </p:txBody>
+      </p:sp>
+      <p:sp>
+        <p:nvSpPr>
+          <p:cNvPr id="3" name="Subtitle 2">
+            <a:extLst>
+              <a:ext uri="{FF2B5EF4-FFF2-40B4-BE49-F238E27FC236}">
+                <a16:creationId xmlns:a16="http://schemas.microsoft.com/office/drawing/2014/main" id="{FC6D5848-5DC5-EC4A-B6C6-4E724295AF44}"/>
+              </a:ext>
+            </a:extLst>
+          </p:cNvPr>
+          <p:cNvSpPr>
+            <a:spLocks noGrp="1"/>
+          </p:cNvSpPr>
+          <p:nvPr>
+            <p:ph type="subTitle" idx="1"/>
+          </p:nvPr>
+        </p:nvSpPr>
+        <p:spPr/>
+        <p:txBody>
+          <a:bodyPr/>
+          <a:lstStyle/>
+          <a:p>
+            <a:endParaRPr lang="en-US"/>
+          </a:p>
+        </p:txBody>
+      </p:sp>
+      <p:pic>
+        <p:nvPicPr>
+          <p:cNvPr id="12" name="Picture 11" descr="A close up of a map&#10;&#10;Description automatically generated">
+            <a:extLst>
+              <a:ext uri="{FF2B5EF4-FFF2-40B4-BE49-F238E27FC236}">
+                <a16:creationId xmlns:a16="http://schemas.microsoft.com/office/drawing/2014/main" id="{3B49E7AE-C88C-9D4E-8356-4485BA679159}"/>
               </a:ext>
             </a:extLst>
           </p:cNvPr>
@@ -4362,14 +4606,137 @@
         </p:blipFill>
         <p:spPr>
           <a:xfrm>
-            <a:off x="0" y="405000"/>
-            <a:ext cx="12192000" cy="6048000"/>
+            <a:off x="0" y="279647"/>
+            <a:ext cx="12192000" cy="6298706"/>
           </a:xfrm>
           <a:prstGeom prst="rect">
             <a:avLst/>
           </a:prstGeom>
         </p:spPr>
       </p:pic>
+      <p:sp>
+        <p:nvSpPr>
+          <p:cNvPr id="6" name="TextBox 5">
+            <a:extLst>
+              <a:ext uri="{FF2B5EF4-FFF2-40B4-BE49-F238E27FC236}">
+                <a16:creationId xmlns:a16="http://schemas.microsoft.com/office/drawing/2014/main" id="{D19E6718-7FE6-2B4B-A497-4E25B9BD6850}"/>
+              </a:ext>
+            </a:extLst>
+          </p:cNvPr>
+          <p:cNvSpPr txBox="1"/>
+          <p:nvPr/>
+        </p:nvSpPr>
+        <p:spPr>
+          <a:xfrm>
+            <a:off x="6286500" y="2406838"/>
+            <a:ext cx="1771650" cy="338554"/>
+          </a:xfrm>
+          <a:prstGeom prst="rect">
+            <a:avLst/>
+          </a:prstGeom>
+          <a:noFill/>
+        </p:spPr>
+        <p:txBody>
+          <a:bodyPr wrap="square" rtlCol="0">
+            <a:spAutoFit/>
+          </a:bodyPr>
+          <a:lstStyle/>
+          <a:p>
+            <a:r>
+              <a:rPr lang="en-US" sz="1600" i="1" dirty="0">
+                <a:solidFill>
+                  <a:schemeClr val="bg1">
+                    <a:lumMod val="50000"/>
+                  </a:schemeClr>
+                </a:solidFill>
+              </a:rPr>
+              <a:t>(Re out of range)</a:t>
+            </a:r>
+          </a:p>
+        </p:txBody>
+      </p:sp>
+      <p:sp>
+        <p:nvSpPr>
+          <p:cNvPr id="7" name="TextBox 6">
+            <a:extLst>
+              <a:ext uri="{FF2B5EF4-FFF2-40B4-BE49-F238E27FC236}">
+                <a16:creationId xmlns:a16="http://schemas.microsoft.com/office/drawing/2014/main" id="{B65E8375-FE1A-8B45-8DCB-F9E7FA52AC63}"/>
+              </a:ext>
+            </a:extLst>
+          </p:cNvPr>
+          <p:cNvSpPr txBox="1"/>
+          <p:nvPr/>
+        </p:nvSpPr>
+        <p:spPr>
+          <a:xfrm>
+            <a:off x="6924675" y="3255962"/>
+            <a:ext cx="1771650" cy="338554"/>
+          </a:xfrm>
+          <a:prstGeom prst="rect">
+            <a:avLst/>
+          </a:prstGeom>
+          <a:noFill/>
+        </p:spPr>
+        <p:txBody>
+          <a:bodyPr wrap="square" rtlCol="0">
+            <a:spAutoFit/>
+          </a:bodyPr>
+          <a:lstStyle/>
+          <a:p>
+            <a:r>
+              <a:rPr lang="en-US" sz="1600" i="1" dirty="0">
+                <a:solidFill>
+                  <a:schemeClr val="bg1">
+                    <a:lumMod val="50000"/>
+                  </a:schemeClr>
+                </a:solidFill>
+              </a:rPr>
+              <a:t>Mean value</a:t>
+            </a:r>
+          </a:p>
+        </p:txBody>
+      </p:sp>
+      <p:cxnSp>
+        <p:nvCxnSpPr>
+          <p:cNvPr id="9" name="Straight Arrow Connector 8">
+            <a:extLst>
+              <a:ext uri="{FF2B5EF4-FFF2-40B4-BE49-F238E27FC236}">
+                <a16:creationId xmlns:a16="http://schemas.microsoft.com/office/drawing/2014/main" id="{04DCD184-3C34-3B42-81C5-68BF268D55B6}"/>
+              </a:ext>
+            </a:extLst>
+          </p:cNvPr>
+          <p:cNvCxnSpPr>
+            <a:cxnSpLocks/>
+          </p:cNvCxnSpPr>
+          <p:nvPr/>
+        </p:nvCxnSpPr>
+        <p:spPr>
+          <a:xfrm flipH="1">
+            <a:off x="6915150" y="3509963"/>
+            <a:ext cx="442913" cy="213008"/>
+          </a:xfrm>
+          <a:prstGeom prst="straightConnector1">
+            <a:avLst/>
+          </a:prstGeom>
+          <a:ln>
+            <a:tailEnd type="triangle"/>
+          </a:ln>
+        </p:spPr>
+        <p:style>
+          <a:lnRef idx="1">
+            <a:schemeClr val="accent1"/>
+          </a:lnRef>
+          <a:fillRef idx="0">
+            <a:schemeClr val="accent1"/>
+          </a:fillRef>
+          <a:effectRef idx="0">
+            <a:schemeClr val="accent1"/>
+          </a:effectRef>
+          <a:fontRef idx="minor">
+            <a:schemeClr val="tx1"/>
+          </a:fontRef>
+        </p:style>
+      </p:cxnSp>
     </p:spTree>
     <p:extLst>
       <p:ext uri="{BB962C8B-B14F-4D97-AF65-F5344CB8AC3E}">
@@ -4383,7 +4750,7 @@
 </p:sld>
 </file>
 
-<file path=ppt/slides/slide4.xml><?xml version="1.0" encoding="utf-8"?>
+<file path=ppt/slides/slide5.xml><?xml version="1.0" encoding="utf-8"?>
 <p:sld xmlns:a="http://schemas.openxmlformats.org/drawingml/2006/main" xmlns:r="http://schemas.openxmlformats.org/officeDocument/2006/relationships" xmlns:p="http://schemas.openxmlformats.org/presentationml/2006/main">
   <p:cSld>
     <p:spTree>
@@ -5289,7 +5656,7 @@
 </p:sld>
 </file>
 
-<file path=ppt/slides/slide5.xml><?xml version="1.0" encoding="utf-8"?>
+<file path=ppt/slides/slide6.xml><?xml version="1.0" encoding="utf-8"?>
 <p:sld xmlns:a="http://schemas.openxmlformats.org/drawingml/2006/main" xmlns:r="http://schemas.openxmlformats.org/officeDocument/2006/relationships" xmlns:p="http://schemas.openxmlformats.org/presentationml/2006/main">
   <p:cSld>
     <p:spTree>

</xml_diff>